<commit_message>
Thêm mục xóa sản phẩm thì xóa luôn ảnh
</commit_message>
<xml_diff>
--- a/Bảo vệ đồ án PHP Fullstack.pptx
+++ b/Bảo vệ đồ án PHP Fullstack.pptx
@@ -10,6 +10,7 @@
     <p:sldId id="258" r:id="rId4"/>
     <p:sldId id="259" r:id="rId5"/>
     <p:sldId id="260" r:id="rId6"/>
+    <p:sldId id="261" r:id="rId7"/>
   </p:sldIdLst>
   <p:sldSz cx="12192000" cy="6858000"/>
   <p:notesSz cx="6858000" cy="9144000"/>
@@ -108,6 +109,11 @@
       </a:defRPr>
     </a:lvl9pPr>
   </p:defaultTextStyle>
+  <p:extLst>
+    <p:ext uri="{EFAFB233-063F-42B5-8137-9DF3F51BA10A}">
+      <p15:sldGuideLst xmlns:p15="http://schemas.microsoft.com/office/powerpoint/2012/main"/>
+    </p:ext>
+  </p:extLst>
 </p:presentation>
 </file>
 
@@ -13665,7 +13671,7 @@
         <p:spPr>
           <a:xfrm>
             <a:off x="1402918" y="1332408"/>
-            <a:ext cx="8058582" cy="3785652"/>
+            <a:ext cx="9722282" cy="4247317"/>
           </a:xfrm>
           <a:prstGeom prst="rect">
             <a:avLst/>
@@ -14527,7 +14533,38 @@
                 <a:ea typeface="Meiryo" panose="020B0604030504040204" pitchFamily="34" charset="-128"/>
                 <a:cs typeface="Segoe UI" panose="020B0502040204020203" pitchFamily="34" charset="0"/>
               </a:rPr>
-              <a:t> Ajax</a:t>
+              <a:t> </a:t>
+            </a:r>
+            <a:r>
+              <a:rPr lang="en-US" sz="2000" dirty="0" smtClean="0">
+                <a:solidFill>
+                  <a:schemeClr val="bg1"/>
+                </a:solidFill>
+                <a:latin typeface="Segoe UI" panose="020B0502040204020203" pitchFamily="34" charset="0"/>
+                <a:ea typeface="Meiryo" panose="020B0604030504040204" pitchFamily="34" charset="-128"/>
+                <a:cs typeface="Segoe UI" panose="020B0502040204020203" pitchFamily="34" charset="0"/>
+              </a:rPr>
+              <a:t>Ajax</a:t>
+            </a:r>
+          </a:p>
+          <a:p>
+            <a:pPr marL="342900" indent="-342900">
+              <a:lnSpc>
+                <a:spcPct val="150000"/>
+              </a:lnSpc>
+              <a:buFont typeface="+mj-lt"/>
+              <a:buAutoNum type="arabicPeriod"/>
+            </a:pPr>
+            <a:r>
+              <a:rPr lang="vi-VN" sz="2000" dirty="0">
+                <a:solidFill>
+                  <a:schemeClr val="bg1"/>
+                </a:solidFill>
+                <a:latin typeface="Segoe UI" panose="020B0502040204020203" pitchFamily="34" charset="0"/>
+                <a:ea typeface="Meiryo" panose="020B0604030504040204" pitchFamily="34" charset="-128"/>
+                <a:cs typeface="Segoe UI" panose="020B0502040204020203" pitchFamily="34" charset="0"/>
+              </a:rPr>
+              <a:t>Tính năng xóa sản phẩm thì xóa luôn ảnh mô tả sản phẩm trong thư mục ảnh</a:t>
             </a:r>
             <a:endParaRPr lang="en-US" sz="2000" dirty="0">
               <a:solidFill>
@@ -16327,6 +16364,1082 @@
     <p:extLst>
       <p:ext uri="{BB962C8B-B14F-4D97-AF65-F5344CB8AC3E}">
         <p14:creationId xmlns:p14="http://schemas.microsoft.com/office/powerpoint/2010/main" val="457412420"/>
+      </p:ext>
+    </p:extLst>
+  </p:cSld>
+  <p:clrMapOvr>
+    <a:masterClrMapping/>
+  </p:clrMapOvr>
+  <p:timing>
+    <p:tnLst>
+      <p:par>
+        <p:cTn id="1" dur="indefinite" restart="never" nodeType="tmRoot"/>
+      </p:par>
+    </p:tnLst>
+  </p:timing>
+</p:sld>
+</file>
+
+<file path=ppt/slides/slide6.xml><?xml version="1.0" encoding="utf-8"?>
+<p:sld xmlns:a="http://schemas.openxmlformats.org/drawingml/2006/main" xmlns:r="http://schemas.openxmlformats.org/officeDocument/2006/relationships" xmlns:p="http://schemas.openxmlformats.org/presentationml/2006/main">
+  <p:cSld>
+    <p:spTree>
+      <p:nvGrpSpPr>
+        <p:cNvPr id="1" name=""/>
+        <p:cNvGrpSpPr/>
+        <p:nvPr/>
+      </p:nvGrpSpPr>
+      <p:grpSpPr>
+        <a:xfrm>
+          <a:off x="0" y="0"/>
+          <a:ext cx="0" cy="0"/>
+          <a:chOff x="0" y="0"/>
+          <a:chExt cx="0" cy="0"/>
+        </a:xfrm>
+      </p:grpSpPr>
+      <p:sp>
+        <p:nvSpPr>
+          <p:cNvPr id="3" name="Subtitle 2"/>
+          <p:cNvSpPr>
+            <a:spLocks noGrp="1"/>
+          </p:cNvSpPr>
+          <p:nvPr>
+            <p:ph type="subTitle" idx="1"/>
+          </p:nvPr>
+        </p:nvSpPr>
+        <p:spPr>
+          <a:xfrm>
+            <a:off x="494555" y="470989"/>
+            <a:ext cx="8825658" cy="861420"/>
+          </a:xfrm>
+        </p:spPr>
+        <p:txBody>
+          <a:bodyPr/>
+          <a:lstStyle/>
+          <a:p>
+            <a:r>
+              <a:rPr lang="en-US" dirty="0" smtClean="0">
+                <a:solidFill>
+                  <a:schemeClr val="bg1">
+                    <a:lumMod val="75000"/>
+                  </a:schemeClr>
+                </a:solidFill>
+              </a:rPr>
+              <a:t>website </a:t>
+            </a:r>
+            <a:r>
+              <a:rPr lang="en-US" dirty="0" err="1" smtClean="0">
+                <a:solidFill>
+                  <a:schemeClr val="bg1">
+                    <a:lumMod val="75000"/>
+                  </a:schemeClr>
+                </a:solidFill>
+              </a:rPr>
+              <a:t>bán</a:t>
+            </a:r>
+            <a:r>
+              <a:rPr lang="en-US" dirty="0" smtClean="0">
+                <a:solidFill>
+                  <a:schemeClr val="bg1">
+                    <a:lumMod val="75000"/>
+                  </a:schemeClr>
+                </a:solidFill>
+              </a:rPr>
+              <a:t> </a:t>
+            </a:r>
+            <a:r>
+              <a:rPr lang="en-US" dirty="0" err="1" smtClean="0">
+                <a:solidFill>
+                  <a:schemeClr val="bg1">
+                    <a:lumMod val="75000"/>
+                  </a:schemeClr>
+                </a:solidFill>
+              </a:rPr>
+              <a:t>hàng</a:t>
+            </a:r>
+            <a:r>
+              <a:rPr lang="en-US" dirty="0" smtClean="0">
+                <a:solidFill>
+                  <a:schemeClr val="bg1">
+                    <a:lumMod val="75000"/>
+                  </a:schemeClr>
+                </a:solidFill>
+              </a:rPr>
+              <a:t> </a:t>
+            </a:r>
+            <a:r>
+              <a:rPr lang="en-US" dirty="0" err="1" smtClean="0">
+                <a:solidFill>
+                  <a:schemeClr val="bg1">
+                    <a:lumMod val="75000"/>
+                  </a:schemeClr>
+                </a:solidFill>
+              </a:rPr>
+              <a:t>vietpro</a:t>
+            </a:r>
+            <a:r>
+              <a:rPr lang="en-US" dirty="0" smtClean="0">
+                <a:solidFill>
+                  <a:schemeClr val="bg1">
+                    <a:lumMod val="75000"/>
+                  </a:schemeClr>
+                </a:solidFill>
+              </a:rPr>
+              <a:t> mobile shop</a:t>
+            </a:r>
+            <a:endParaRPr lang="en-US" dirty="0">
+              <a:solidFill>
+                <a:schemeClr val="bg1">
+                  <a:lumMod val="75000"/>
+                </a:schemeClr>
+              </a:solidFill>
+            </a:endParaRPr>
+          </a:p>
+        </p:txBody>
+      </p:sp>
+      <p:sp>
+        <p:nvSpPr>
+          <p:cNvPr id="6" name="Rectangle 5"/>
+          <p:cNvSpPr/>
+          <p:nvPr/>
+        </p:nvSpPr>
+        <p:spPr>
+          <a:xfrm>
+            <a:off x="681480" y="829456"/>
+            <a:ext cx="9630920" cy="600164"/>
+          </a:xfrm>
+          <a:prstGeom prst="rect">
+            <a:avLst/>
+          </a:prstGeom>
+        </p:spPr>
+        <p:txBody>
+          <a:bodyPr wrap="square">
+            <a:spAutoFit/>
+          </a:bodyPr>
+          <a:lstStyle/>
+          <a:p>
+            <a:pPr>
+              <a:lnSpc>
+                <a:spcPct val="150000"/>
+              </a:lnSpc>
+            </a:pPr>
+            <a:r>
+              <a:rPr lang="en-US" sz="2200" b="1" dirty="0">
+                <a:solidFill>
+                  <a:schemeClr val="bg1"/>
+                </a:solidFill>
+                <a:latin typeface="Segoe UI" panose="020B0502040204020203" pitchFamily="34" charset="0"/>
+                <a:ea typeface="Meiryo" panose="020B0604030504040204" pitchFamily="34" charset="-128"/>
+                <a:cs typeface="Segoe UI" panose="020B0502040204020203" pitchFamily="34" charset="0"/>
+              </a:rPr>
+              <a:t>4</a:t>
+            </a:r>
+            <a:r>
+              <a:rPr lang="vi-VN" sz="2200" b="1" dirty="0" smtClean="0">
+                <a:solidFill>
+                  <a:schemeClr val="bg1"/>
+                </a:solidFill>
+                <a:latin typeface="Segoe UI" panose="020B0502040204020203" pitchFamily="34" charset="0"/>
+                <a:ea typeface="Meiryo" panose="020B0604030504040204" pitchFamily="34" charset="-128"/>
+                <a:cs typeface="Segoe UI" panose="020B0502040204020203" pitchFamily="34" charset="0"/>
+              </a:rPr>
+              <a:t>. </a:t>
+            </a:r>
+            <a:r>
+              <a:rPr lang="en-US" sz="2200" b="1" dirty="0" smtClean="0">
+                <a:solidFill>
+                  <a:schemeClr val="bg1"/>
+                </a:solidFill>
+                <a:latin typeface="Segoe UI" panose="020B0502040204020203" pitchFamily="34" charset="0"/>
+                <a:ea typeface="Meiryo" panose="020B0604030504040204" pitchFamily="34" charset="-128"/>
+                <a:cs typeface="Segoe UI" panose="020B0502040204020203" pitchFamily="34" charset="0"/>
+              </a:rPr>
+              <a:t>X</a:t>
+            </a:r>
+            <a:r>
+              <a:rPr lang="vi-VN" sz="2200" b="1" dirty="0" smtClean="0">
+                <a:solidFill>
+                  <a:schemeClr val="bg1"/>
+                </a:solidFill>
+                <a:latin typeface="Segoe UI" panose="020B0502040204020203" pitchFamily="34" charset="0"/>
+                <a:ea typeface="Meiryo" panose="020B0604030504040204" pitchFamily="34" charset="-128"/>
+                <a:cs typeface="Segoe UI" panose="020B0502040204020203" pitchFamily="34" charset="0"/>
+              </a:rPr>
+              <a:t>óa </a:t>
+            </a:r>
+            <a:r>
+              <a:rPr lang="vi-VN" sz="2200" b="1" dirty="0">
+                <a:solidFill>
+                  <a:schemeClr val="bg1"/>
+                </a:solidFill>
+                <a:latin typeface="Segoe UI" panose="020B0502040204020203" pitchFamily="34" charset="0"/>
+                <a:ea typeface="Meiryo" panose="020B0604030504040204" pitchFamily="34" charset="-128"/>
+                <a:cs typeface="Segoe UI" panose="020B0502040204020203" pitchFamily="34" charset="0"/>
+              </a:rPr>
+              <a:t>sản phẩm thì xóa luôn ảnh mô tả sản phẩm trong thư mục ảnh</a:t>
+            </a:r>
+            <a:endParaRPr lang="en-US" sz="2200" b="1" dirty="0">
+              <a:solidFill>
+                <a:schemeClr val="bg1"/>
+              </a:solidFill>
+              <a:latin typeface="Segoe UI" panose="020B0502040204020203" pitchFamily="34" charset="0"/>
+              <a:ea typeface="Meiryo" panose="020B0604030504040204" pitchFamily="34" charset="-128"/>
+              <a:cs typeface="Segoe UI" panose="020B0502040204020203" pitchFamily="34" charset="0"/>
+            </a:endParaRPr>
+          </a:p>
+        </p:txBody>
+      </p:sp>
+      <p:sp>
+        <p:nvSpPr>
+          <p:cNvPr id="5" name="Rectangle 4"/>
+          <p:cNvSpPr/>
+          <p:nvPr/>
+        </p:nvSpPr>
+        <p:spPr>
+          <a:xfrm>
+            <a:off x="859280" y="1724993"/>
+            <a:ext cx="4817620" cy="2031325"/>
+          </a:xfrm>
+          <a:prstGeom prst="rect">
+            <a:avLst/>
+          </a:prstGeom>
+        </p:spPr>
+        <p:txBody>
+          <a:bodyPr wrap="square">
+            <a:spAutoFit/>
+          </a:bodyPr>
+          <a:lstStyle/>
+          <a:p>
+            <a:r>
+              <a:rPr lang="en-US" dirty="0" err="1" smtClean="0">
+                <a:solidFill>
+                  <a:schemeClr val="bg1"/>
+                </a:solidFill>
+                <a:latin typeface="Segoe UI" panose="020B0502040204020203" pitchFamily="34" charset="0"/>
+                <a:ea typeface="Meiryo" panose="020B0604030504040204" pitchFamily="34" charset="-128"/>
+                <a:cs typeface="Segoe UI" panose="020B0502040204020203" pitchFamily="34" charset="0"/>
+              </a:rPr>
+              <a:t>Trước</a:t>
+            </a:r>
+            <a:r>
+              <a:rPr lang="en-US" dirty="0" smtClean="0">
+                <a:solidFill>
+                  <a:schemeClr val="bg1"/>
+                </a:solidFill>
+                <a:latin typeface="Segoe UI" panose="020B0502040204020203" pitchFamily="34" charset="0"/>
+                <a:ea typeface="Meiryo" panose="020B0604030504040204" pitchFamily="34" charset="-128"/>
+                <a:cs typeface="Segoe UI" panose="020B0502040204020203" pitchFamily="34" charset="0"/>
+              </a:rPr>
+              <a:t> </a:t>
+            </a:r>
+            <a:r>
+              <a:rPr lang="en-US" dirty="0" err="1" smtClean="0">
+                <a:solidFill>
+                  <a:schemeClr val="bg1"/>
+                </a:solidFill>
+                <a:latin typeface="Segoe UI" panose="020B0502040204020203" pitchFamily="34" charset="0"/>
+                <a:ea typeface="Meiryo" panose="020B0604030504040204" pitchFamily="34" charset="-128"/>
+                <a:cs typeface="Segoe UI" panose="020B0502040204020203" pitchFamily="34" charset="0"/>
+              </a:rPr>
+              <a:t>khi</a:t>
+            </a:r>
+            <a:r>
+              <a:rPr lang="en-US" dirty="0" smtClean="0">
+                <a:solidFill>
+                  <a:schemeClr val="bg1"/>
+                </a:solidFill>
+                <a:latin typeface="Segoe UI" panose="020B0502040204020203" pitchFamily="34" charset="0"/>
+                <a:ea typeface="Meiryo" panose="020B0604030504040204" pitchFamily="34" charset="-128"/>
+                <a:cs typeface="Segoe UI" panose="020B0502040204020203" pitchFamily="34" charset="0"/>
+              </a:rPr>
+              <a:t> </a:t>
+            </a:r>
+            <a:r>
+              <a:rPr lang="en-US" dirty="0" err="1" smtClean="0">
+                <a:solidFill>
+                  <a:schemeClr val="bg1"/>
+                </a:solidFill>
+                <a:latin typeface="Segoe UI" panose="020B0502040204020203" pitchFamily="34" charset="0"/>
+                <a:ea typeface="Meiryo" panose="020B0604030504040204" pitchFamily="34" charset="-128"/>
+                <a:cs typeface="Segoe UI" panose="020B0502040204020203" pitchFamily="34" charset="0"/>
+              </a:rPr>
+              <a:t>tiến</a:t>
+            </a:r>
+            <a:r>
+              <a:rPr lang="en-US" dirty="0" smtClean="0">
+                <a:solidFill>
+                  <a:schemeClr val="bg1"/>
+                </a:solidFill>
+                <a:latin typeface="Segoe UI" panose="020B0502040204020203" pitchFamily="34" charset="0"/>
+                <a:ea typeface="Meiryo" panose="020B0604030504040204" pitchFamily="34" charset="-128"/>
+                <a:cs typeface="Segoe UI" panose="020B0502040204020203" pitchFamily="34" charset="0"/>
+              </a:rPr>
+              <a:t> </a:t>
+            </a:r>
+            <a:r>
+              <a:rPr lang="en-US" dirty="0" err="1" smtClean="0">
+                <a:solidFill>
+                  <a:schemeClr val="bg1"/>
+                </a:solidFill>
+                <a:latin typeface="Segoe UI" panose="020B0502040204020203" pitchFamily="34" charset="0"/>
+                <a:ea typeface="Meiryo" panose="020B0604030504040204" pitchFamily="34" charset="-128"/>
+                <a:cs typeface="Segoe UI" panose="020B0502040204020203" pitchFamily="34" charset="0"/>
+              </a:rPr>
+              <a:t>hành</a:t>
+            </a:r>
+            <a:r>
+              <a:rPr lang="en-US" dirty="0" smtClean="0">
+                <a:solidFill>
+                  <a:schemeClr val="bg1"/>
+                </a:solidFill>
+                <a:latin typeface="Segoe UI" panose="020B0502040204020203" pitchFamily="34" charset="0"/>
+                <a:ea typeface="Meiryo" panose="020B0604030504040204" pitchFamily="34" charset="-128"/>
+                <a:cs typeface="Segoe UI" panose="020B0502040204020203" pitchFamily="34" charset="0"/>
+              </a:rPr>
+              <a:t> </a:t>
+            </a:r>
+            <a:r>
+              <a:rPr lang="en-US" dirty="0" err="1" smtClean="0">
+                <a:solidFill>
+                  <a:schemeClr val="bg1"/>
+                </a:solidFill>
+                <a:latin typeface="Segoe UI" panose="020B0502040204020203" pitchFamily="34" charset="0"/>
+                <a:ea typeface="Meiryo" panose="020B0604030504040204" pitchFamily="34" charset="-128"/>
+                <a:cs typeface="Segoe UI" panose="020B0502040204020203" pitchFamily="34" charset="0"/>
+              </a:rPr>
+              <a:t>xóa</a:t>
+            </a:r>
+            <a:r>
+              <a:rPr lang="en-US" dirty="0" smtClean="0">
+                <a:solidFill>
+                  <a:schemeClr val="bg1"/>
+                </a:solidFill>
+                <a:latin typeface="Segoe UI" panose="020B0502040204020203" pitchFamily="34" charset="0"/>
+                <a:ea typeface="Meiryo" panose="020B0604030504040204" pitchFamily="34" charset="-128"/>
+                <a:cs typeface="Segoe UI" panose="020B0502040204020203" pitchFamily="34" charset="0"/>
+              </a:rPr>
+              <a:t> </a:t>
+            </a:r>
+            <a:r>
+              <a:rPr lang="en-US" dirty="0" err="1" smtClean="0">
+                <a:solidFill>
+                  <a:schemeClr val="bg1"/>
+                </a:solidFill>
+                <a:latin typeface="Segoe UI" panose="020B0502040204020203" pitchFamily="34" charset="0"/>
+                <a:ea typeface="Meiryo" panose="020B0604030504040204" pitchFamily="34" charset="-128"/>
+                <a:cs typeface="Segoe UI" panose="020B0502040204020203" pitchFamily="34" charset="0"/>
+              </a:rPr>
+              <a:t>sản</a:t>
+            </a:r>
+            <a:r>
+              <a:rPr lang="en-US" dirty="0" smtClean="0">
+                <a:solidFill>
+                  <a:schemeClr val="bg1"/>
+                </a:solidFill>
+                <a:latin typeface="Segoe UI" panose="020B0502040204020203" pitchFamily="34" charset="0"/>
+                <a:ea typeface="Meiryo" panose="020B0604030504040204" pitchFamily="34" charset="-128"/>
+                <a:cs typeface="Segoe UI" panose="020B0502040204020203" pitchFamily="34" charset="0"/>
+              </a:rPr>
+              <a:t> </a:t>
+            </a:r>
+            <a:r>
+              <a:rPr lang="en-US" dirty="0" err="1" smtClean="0">
+                <a:solidFill>
+                  <a:schemeClr val="bg1"/>
+                </a:solidFill>
+                <a:latin typeface="Segoe UI" panose="020B0502040204020203" pitchFamily="34" charset="0"/>
+                <a:ea typeface="Meiryo" panose="020B0604030504040204" pitchFamily="34" charset="-128"/>
+                <a:cs typeface="Segoe UI" panose="020B0502040204020203" pitchFamily="34" charset="0"/>
+              </a:rPr>
+              <a:t>phẩm</a:t>
+            </a:r>
+            <a:r>
+              <a:rPr lang="en-US" dirty="0" smtClean="0">
+                <a:solidFill>
+                  <a:schemeClr val="bg1"/>
+                </a:solidFill>
+                <a:latin typeface="Segoe UI" panose="020B0502040204020203" pitchFamily="34" charset="0"/>
+                <a:ea typeface="Meiryo" panose="020B0604030504040204" pitchFamily="34" charset="-128"/>
+                <a:cs typeface="Segoe UI" panose="020B0502040204020203" pitchFamily="34" charset="0"/>
+              </a:rPr>
+              <a:t> </a:t>
+            </a:r>
+            <a:r>
+              <a:rPr lang="en-US" dirty="0" err="1" smtClean="0">
+                <a:solidFill>
+                  <a:schemeClr val="bg1"/>
+                </a:solidFill>
+                <a:latin typeface="Segoe UI" panose="020B0502040204020203" pitchFamily="34" charset="0"/>
+                <a:ea typeface="Meiryo" panose="020B0604030504040204" pitchFamily="34" charset="-128"/>
+                <a:cs typeface="Segoe UI" panose="020B0502040204020203" pitchFamily="34" charset="0"/>
+              </a:rPr>
+              <a:t>sẽ</a:t>
+            </a:r>
+            <a:r>
+              <a:rPr lang="en-US" dirty="0" smtClean="0">
+                <a:solidFill>
+                  <a:schemeClr val="bg1"/>
+                </a:solidFill>
+                <a:latin typeface="Segoe UI" panose="020B0502040204020203" pitchFamily="34" charset="0"/>
+                <a:ea typeface="Meiryo" panose="020B0604030504040204" pitchFamily="34" charset="-128"/>
+                <a:cs typeface="Segoe UI" panose="020B0502040204020203" pitchFamily="34" charset="0"/>
+              </a:rPr>
+              <a:t> </a:t>
+            </a:r>
+            <a:r>
+              <a:rPr lang="en-US" dirty="0" err="1" smtClean="0">
+                <a:solidFill>
+                  <a:schemeClr val="bg1"/>
+                </a:solidFill>
+                <a:latin typeface="Segoe UI" panose="020B0502040204020203" pitchFamily="34" charset="0"/>
+                <a:ea typeface="Meiryo" panose="020B0604030504040204" pitchFamily="34" charset="-128"/>
+                <a:cs typeface="Segoe UI" panose="020B0502040204020203" pitchFamily="34" charset="0"/>
+              </a:rPr>
+              <a:t>sử</a:t>
+            </a:r>
+            <a:r>
+              <a:rPr lang="en-US" dirty="0" smtClean="0">
+                <a:solidFill>
+                  <a:schemeClr val="bg1"/>
+                </a:solidFill>
+                <a:latin typeface="Segoe UI" panose="020B0502040204020203" pitchFamily="34" charset="0"/>
+                <a:ea typeface="Meiryo" panose="020B0604030504040204" pitchFamily="34" charset="-128"/>
+                <a:cs typeface="Segoe UI" panose="020B0502040204020203" pitchFamily="34" charset="0"/>
+              </a:rPr>
+              <a:t> </a:t>
+            </a:r>
+            <a:r>
+              <a:rPr lang="en-US" dirty="0" err="1" smtClean="0">
+                <a:solidFill>
+                  <a:schemeClr val="bg1"/>
+                </a:solidFill>
+                <a:latin typeface="Segoe UI" panose="020B0502040204020203" pitchFamily="34" charset="0"/>
+                <a:ea typeface="Meiryo" panose="020B0604030504040204" pitchFamily="34" charset="-128"/>
+                <a:cs typeface="Segoe UI" panose="020B0502040204020203" pitchFamily="34" charset="0"/>
+              </a:rPr>
+              <a:t>dụng</a:t>
+            </a:r>
+            <a:r>
+              <a:rPr lang="en-US" dirty="0" smtClean="0">
+                <a:solidFill>
+                  <a:schemeClr val="bg1"/>
+                </a:solidFill>
+                <a:latin typeface="Segoe UI" panose="020B0502040204020203" pitchFamily="34" charset="0"/>
+                <a:ea typeface="Meiryo" panose="020B0604030504040204" pitchFamily="34" charset="-128"/>
+                <a:cs typeface="Segoe UI" panose="020B0502040204020203" pitchFamily="34" charset="0"/>
+              </a:rPr>
+              <a:t> </a:t>
+            </a:r>
+            <a:r>
+              <a:rPr lang="en-US" dirty="0" err="1" smtClean="0">
+                <a:solidFill>
+                  <a:schemeClr val="bg1"/>
+                </a:solidFill>
+                <a:latin typeface="Segoe UI" panose="020B0502040204020203" pitchFamily="34" charset="0"/>
+                <a:ea typeface="Meiryo" panose="020B0604030504040204" pitchFamily="34" charset="-128"/>
+                <a:cs typeface="Segoe UI" panose="020B0502040204020203" pitchFamily="34" charset="0"/>
+              </a:rPr>
+              <a:t>câu</a:t>
+            </a:r>
+            <a:r>
+              <a:rPr lang="en-US" dirty="0" smtClean="0">
+                <a:solidFill>
+                  <a:schemeClr val="bg1"/>
+                </a:solidFill>
+                <a:latin typeface="Segoe UI" panose="020B0502040204020203" pitchFamily="34" charset="0"/>
+                <a:ea typeface="Meiryo" panose="020B0604030504040204" pitchFamily="34" charset="-128"/>
+                <a:cs typeface="Segoe UI" panose="020B0502040204020203" pitchFamily="34" charset="0"/>
+              </a:rPr>
+              <a:t> </a:t>
+            </a:r>
+            <a:r>
+              <a:rPr lang="en-US" dirty="0" err="1" smtClean="0">
+                <a:solidFill>
+                  <a:schemeClr val="bg1"/>
+                </a:solidFill>
+                <a:latin typeface="Segoe UI" panose="020B0502040204020203" pitchFamily="34" charset="0"/>
+                <a:ea typeface="Meiryo" panose="020B0604030504040204" pitchFamily="34" charset="-128"/>
+                <a:cs typeface="Segoe UI" panose="020B0502040204020203" pitchFamily="34" charset="0"/>
+              </a:rPr>
+              <a:t>lệnh</a:t>
+            </a:r>
+            <a:r>
+              <a:rPr lang="en-US" dirty="0" smtClean="0">
+                <a:solidFill>
+                  <a:schemeClr val="bg1"/>
+                </a:solidFill>
+                <a:latin typeface="Segoe UI" panose="020B0502040204020203" pitchFamily="34" charset="0"/>
+                <a:ea typeface="Meiryo" panose="020B0604030504040204" pitchFamily="34" charset="-128"/>
+                <a:cs typeface="Segoe UI" panose="020B0502040204020203" pitchFamily="34" charset="0"/>
+              </a:rPr>
+              <a:t> SQL SELECT </a:t>
+            </a:r>
+            <a:r>
+              <a:rPr lang="en-US" dirty="0" err="1" smtClean="0">
+                <a:solidFill>
+                  <a:schemeClr val="bg1"/>
+                </a:solidFill>
+                <a:latin typeface="Segoe UI" panose="020B0502040204020203" pitchFamily="34" charset="0"/>
+                <a:ea typeface="Meiryo" panose="020B0604030504040204" pitchFamily="34" charset="-128"/>
+                <a:cs typeface="Segoe UI" panose="020B0502040204020203" pitchFamily="34" charset="0"/>
+              </a:rPr>
+              <a:t>để</a:t>
+            </a:r>
+            <a:r>
+              <a:rPr lang="en-US" dirty="0" smtClean="0">
+                <a:solidFill>
+                  <a:schemeClr val="bg1"/>
+                </a:solidFill>
+                <a:latin typeface="Segoe UI" panose="020B0502040204020203" pitchFamily="34" charset="0"/>
+                <a:ea typeface="Meiryo" panose="020B0604030504040204" pitchFamily="34" charset="-128"/>
+                <a:cs typeface="Segoe UI" panose="020B0502040204020203" pitchFamily="34" charset="0"/>
+              </a:rPr>
+              <a:t> </a:t>
+            </a:r>
+            <a:r>
+              <a:rPr lang="en-US" dirty="0" err="1" smtClean="0">
+                <a:solidFill>
+                  <a:schemeClr val="bg1"/>
+                </a:solidFill>
+                <a:latin typeface="Segoe UI" panose="020B0502040204020203" pitchFamily="34" charset="0"/>
+                <a:ea typeface="Meiryo" panose="020B0604030504040204" pitchFamily="34" charset="-128"/>
+                <a:cs typeface="Segoe UI" panose="020B0502040204020203" pitchFamily="34" charset="0"/>
+              </a:rPr>
+              <a:t>lấy</a:t>
+            </a:r>
+            <a:r>
+              <a:rPr lang="en-US" dirty="0" smtClean="0">
+                <a:solidFill>
+                  <a:schemeClr val="bg1"/>
+                </a:solidFill>
+                <a:latin typeface="Segoe UI" panose="020B0502040204020203" pitchFamily="34" charset="0"/>
+                <a:ea typeface="Meiryo" panose="020B0604030504040204" pitchFamily="34" charset="-128"/>
+                <a:cs typeface="Segoe UI" panose="020B0502040204020203" pitchFamily="34" charset="0"/>
+              </a:rPr>
+              <a:t> </a:t>
+            </a:r>
+            <a:r>
+              <a:rPr lang="en-US" dirty="0" err="1" smtClean="0">
+                <a:solidFill>
+                  <a:schemeClr val="bg1"/>
+                </a:solidFill>
+                <a:latin typeface="Segoe UI" panose="020B0502040204020203" pitchFamily="34" charset="0"/>
+                <a:ea typeface="Meiryo" panose="020B0604030504040204" pitchFamily="34" charset="-128"/>
+                <a:cs typeface="Segoe UI" panose="020B0502040204020203" pitchFamily="34" charset="0"/>
+              </a:rPr>
+              <a:t>ra</a:t>
+            </a:r>
+            <a:r>
+              <a:rPr lang="en-US" dirty="0" smtClean="0">
+                <a:solidFill>
+                  <a:schemeClr val="bg1"/>
+                </a:solidFill>
+                <a:latin typeface="Segoe UI" panose="020B0502040204020203" pitchFamily="34" charset="0"/>
+                <a:ea typeface="Meiryo" panose="020B0604030504040204" pitchFamily="34" charset="-128"/>
+                <a:cs typeface="Segoe UI" panose="020B0502040204020203" pitchFamily="34" charset="0"/>
+              </a:rPr>
+              <a:t> </a:t>
+            </a:r>
+            <a:r>
+              <a:rPr lang="en-US" dirty="0" err="1" smtClean="0">
+                <a:solidFill>
+                  <a:schemeClr val="bg1"/>
+                </a:solidFill>
+                <a:latin typeface="Segoe UI" panose="020B0502040204020203" pitchFamily="34" charset="0"/>
+                <a:ea typeface="Meiryo" panose="020B0604030504040204" pitchFamily="34" charset="-128"/>
+                <a:cs typeface="Segoe UI" panose="020B0502040204020203" pitchFamily="34" charset="0"/>
+              </a:rPr>
+              <a:t>tên</a:t>
+            </a:r>
+            <a:r>
+              <a:rPr lang="en-US" dirty="0" smtClean="0">
+                <a:solidFill>
+                  <a:schemeClr val="bg1"/>
+                </a:solidFill>
+                <a:latin typeface="Segoe UI" panose="020B0502040204020203" pitchFamily="34" charset="0"/>
+                <a:ea typeface="Meiryo" panose="020B0604030504040204" pitchFamily="34" charset="-128"/>
+                <a:cs typeface="Segoe UI" panose="020B0502040204020203" pitchFamily="34" charset="0"/>
+              </a:rPr>
+              <a:t> </a:t>
+            </a:r>
+            <a:r>
+              <a:rPr lang="en-US" dirty="0" err="1" smtClean="0">
+                <a:solidFill>
+                  <a:schemeClr val="bg1"/>
+                </a:solidFill>
+                <a:latin typeface="Segoe UI" panose="020B0502040204020203" pitchFamily="34" charset="0"/>
+                <a:ea typeface="Meiryo" panose="020B0604030504040204" pitchFamily="34" charset="-128"/>
+                <a:cs typeface="Segoe UI" panose="020B0502040204020203" pitchFamily="34" charset="0"/>
+              </a:rPr>
+              <a:t>ảnh</a:t>
+            </a:r>
+            <a:r>
+              <a:rPr lang="en-US" dirty="0" smtClean="0">
+                <a:solidFill>
+                  <a:schemeClr val="bg1"/>
+                </a:solidFill>
+                <a:latin typeface="Segoe UI" panose="020B0502040204020203" pitchFamily="34" charset="0"/>
+                <a:ea typeface="Meiryo" panose="020B0604030504040204" pitchFamily="34" charset="-128"/>
+                <a:cs typeface="Segoe UI" panose="020B0502040204020203" pitchFamily="34" charset="0"/>
+              </a:rPr>
+              <a:t> </a:t>
+            </a:r>
+            <a:r>
+              <a:rPr lang="en-US" dirty="0" err="1" smtClean="0">
+                <a:solidFill>
+                  <a:schemeClr val="bg1"/>
+                </a:solidFill>
+                <a:latin typeface="Segoe UI" panose="020B0502040204020203" pitchFamily="34" charset="0"/>
+                <a:ea typeface="Meiryo" panose="020B0604030504040204" pitchFamily="34" charset="-128"/>
+                <a:cs typeface="Segoe UI" panose="020B0502040204020203" pitchFamily="34" charset="0"/>
+              </a:rPr>
+              <a:t>của</a:t>
+            </a:r>
+            <a:r>
+              <a:rPr lang="en-US" dirty="0" smtClean="0">
+                <a:solidFill>
+                  <a:schemeClr val="bg1"/>
+                </a:solidFill>
+                <a:latin typeface="Segoe UI" panose="020B0502040204020203" pitchFamily="34" charset="0"/>
+                <a:ea typeface="Meiryo" panose="020B0604030504040204" pitchFamily="34" charset="-128"/>
+                <a:cs typeface="Segoe UI" panose="020B0502040204020203" pitchFamily="34" charset="0"/>
+              </a:rPr>
+              <a:t> </a:t>
+            </a:r>
+            <a:r>
+              <a:rPr lang="en-US" dirty="0" err="1" smtClean="0">
+                <a:solidFill>
+                  <a:schemeClr val="bg1"/>
+                </a:solidFill>
+                <a:latin typeface="Segoe UI" panose="020B0502040204020203" pitchFamily="34" charset="0"/>
+                <a:ea typeface="Meiryo" panose="020B0604030504040204" pitchFamily="34" charset="-128"/>
+                <a:cs typeface="Segoe UI" panose="020B0502040204020203" pitchFamily="34" charset="0"/>
+              </a:rPr>
+              <a:t>sản</a:t>
+            </a:r>
+            <a:r>
+              <a:rPr lang="en-US" dirty="0" smtClean="0">
+                <a:solidFill>
+                  <a:schemeClr val="bg1"/>
+                </a:solidFill>
+                <a:latin typeface="Segoe UI" panose="020B0502040204020203" pitchFamily="34" charset="0"/>
+                <a:ea typeface="Meiryo" panose="020B0604030504040204" pitchFamily="34" charset="-128"/>
+                <a:cs typeface="Segoe UI" panose="020B0502040204020203" pitchFamily="34" charset="0"/>
+              </a:rPr>
+              <a:t> </a:t>
+            </a:r>
+            <a:r>
+              <a:rPr lang="en-US" dirty="0" err="1" smtClean="0">
+                <a:solidFill>
+                  <a:schemeClr val="bg1"/>
+                </a:solidFill>
+                <a:latin typeface="Segoe UI" panose="020B0502040204020203" pitchFamily="34" charset="0"/>
+                <a:ea typeface="Meiryo" panose="020B0604030504040204" pitchFamily="34" charset="-128"/>
+                <a:cs typeface="Segoe UI" panose="020B0502040204020203" pitchFamily="34" charset="0"/>
+              </a:rPr>
+              <a:t>phẩm</a:t>
+            </a:r>
+            <a:r>
+              <a:rPr lang="en-US" dirty="0" smtClean="0">
+                <a:solidFill>
+                  <a:schemeClr val="bg1"/>
+                </a:solidFill>
+                <a:latin typeface="Segoe UI" panose="020B0502040204020203" pitchFamily="34" charset="0"/>
+                <a:ea typeface="Meiryo" panose="020B0604030504040204" pitchFamily="34" charset="-128"/>
+                <a:cs typeface="Segoe UI" panose="020B0502040204020203" pitchFamily="34" charset="0"/>
+              </a:rPr>
+              <a:t>.</a:t>
+            </a:r>
+          </a:p>
+          <a:p>
+            <a:endParaRPr lang="en-US" dirty="0">
+              <a:solidFill>
+                <a:schemeClr val="bg1"/>
+              </a:solidFill>
+              <a:latin typeface="Segoe UI" panose="020B0502040204020203" pitchFamily="34" charset="0"/>
+              <a:ea typeface="Meiryo" panose="020B0604030504040204" pitchFamily="34" charset="-128"/>
+              <a:cs typeface="Segoe UI" panose="020B0502040204020203" pitchFamily="34" charset="0"/>
+            </a:endParaRPr>
+          </a:p>
+          <a:p>
+            <a:r>
+              <a:rPr lang="en-US" dirty="0" err="1" smtClean="0">
+                <a:solidFill>
+                  <a:schemeClr val="bg1"/>
+                </a:solidFill>
+                <a:latin typeface="Segoe UI" panose="020B0502040204020203" pitchFamily="34" charset="0"/>
+                <a:ea typeface="Meiryo" panose="020B0604030504040204" pitchFamily="34" charset="-128"/>
+                <a:cs typeface="Segoe UI" panose="020B0502040204020203" pitchFamily="34" charset="0"/>
+              </a:rPr>
+              <a:t>Sau</a:t>
+            </a:r>
+            <a:r>
+              <a:rPr lang="en-US" dirty="0" smtClean="0">
+                <a:solidFill>
+                  <a:schemeClr val="bg1"/>
+                </a:solidFill>
+                <a:latin typeface="Segoe UI" panose="020B0502040204020203" pitchFamily="34" charset="0"/>
+                <a:ea typeface="Meiryo" panose="020B0604030504040204" pitchFamily="34" charset="-128"/>
+                <a:cs typeface="Segoe UI" panose="020B0502040204020203" pitchFamily="34" charset="0"/>
+              </a:rPr>
+              <a:t> </a:t>
+            </a:r>
+            <a:r>
+              <a:rPr lang="en-US" dirty="0" err="1" smtClean="0">
+                <a:solidFill>
+                  <a:schemeClr val="bg1"/>
+                </a:solidFill>
+                <a:latin typeface="Segoe UI" panose="020B0502040204020203" pitchFamily="34" charset="0"/>
+                <a:ea typeface="Meiryo" panose="020B0604030504040204" pitchFamily="34" charset="-128"/>
+                <a:cs typeface="Segoe UI" panose="020B0502040204020203" pitchFamily="34" charset="0"/>
+              </a:rPr>
+              <a:t>đó</a:t>
+            </a:r>
+            <a:r>
+              <a:rPr lang="en-US" dirty="0" smtClean="0">
+                <a:solidFill>
+                  <a:schemeClr val="bg1"/>
+                </a:solidFill>
+                <a:latin typeface="Segoe UI" panose="020B0502040204020203" pitchFamily="34" charset="0"/>
+                <a:ea typeface="Meiryo" panose="020B0604030504040204" pitchFamily="34" charset="-128"/>
+                <a:cs typeface="Segoe UI" panose="020B0502040204020203" pitchFamily="34" charset="0"/>
+              </a:rPr>
+              <a:t> </a:t>
+            </a:r>
+            <a:r>
+              <a:rPr lang="en-US" dirty="0" err="1" smtClean="0">
+                <a:solidFill>
+                  <a:schemeClr val="bg1"/>
+                </a:solidFill>
+                <a:latin typeface="Segoe UI" panose="020B0502040204020203" pitchFamily="34" charset="0"/>
+                <a:ea typeface="Meiryo" panose="020B0604030504040204" pitchFamily="34" charset="-128"/>
+                <a:cs typeface="Segoe UI" panose="020B0502040204020203" pitchFamily="34" charset="0"/>
+              </a:rPr>
+              <a:t>dùng</a:t>
+            </a:r>
+            <a:r>
+              <a:rPr lang="en-US" dirty="0" smtClean="0">
+                <a:solidFill>
+                  <a:schemeClr val="bg1"/>
+                </a:solidFill>
+                <a:latin typeface="Segoe UI" panose="020B0502040204020203" pitchFamily="34" charset="0"/>
+                <a:ea typeface="Meiryo" panose="020B0604030504040204" pitchFamily="34" charset="-128"/>
+                <a:cs typeface="Segoe UI" panose="020B0502040204020203" pitchFamily="34" charset="0"/>
+              </a:rPr>
+              <a:t> </a:t>
+            </a:r>
+            <a:r>
+              <a:rPr lang="en-US" dirty="0" err="1" smtClean="0">
+                <a:solidFill>
+                  <a:schemeClr val="bg1"/>
+                </a:solidFill>
+                <a:latin typeface="Segoe UI" panose="020B0502040204020203" pitchFamily="34" charset="0"/>
+                <a:ea typeface="Meiryo" panose="020B0604030504040204" pitchFamily="34" charset="-128"/>
+                <a:cs typeface="Segoe UI" panose="020B0502040204020203" pitchFamily="34" charset="0"/>
+              </a:rPr>
+              <a:t>lệnh</a:t>
+            </a:r>
+            <a:r>
+              <a:rPr lang="en-US" dirty="0" smtClean="0">
+                <a:solidFill>
+                  <a:schemeClr val="bg1"/>
+                </a:solidFill>
+                <a:latin typeface="Segoe UI" panose="020B0502040204020203" pitchFamily="34" charset="0"/>
+                <a:ea typeface="Meiryo" panose="020B0604030504040204" pitchFamily="34" charset="-128"/>
+                <a:cs typeface="Segoe UI" panose="020B0502040204020203" pitchFamily="34" charset="0"/>
+              </a:rPr>
+              <a:t> unlink </a:t>
+            </a:r>
+            <a:r>
+              <a:rPr lang="en-US" dirty="0" err="1" smtClean="0">
+                <a:solidFill>
+                  <a:schemeClr val="bg1"/>
+                </a:solidFill>
+                <a:latin typeface="Segoe UI" panose="020B0502040204020203" pitchFamily="34" charset="0"/>
+                <a:ea typeface="Meiryo" panose="020B0604030504040204" pitchFamily="34" charset="-128"/>
+                <a:cs typeface="Segoe UI" panose="020B0502040204020203" pitchFamily="34" charset="0"/>
+              </a:rPr>
+              <a:t>để</a:t>
+            </a:r>
+            <a:r>
+              <a:rPr lang="en-US" dirty="0" smtClean="0">
+                <a:solidFill>
+                  <a:schemeClr val="bg1"/>
+                </a:solidFill>
+                <a:latin typeface="Segoe UI" panose="020B0502040204020203" pitchFamily="34" charset="0"/>
+                <a:ea typeface="Meiryo" panose="020B0604030504040204" pitchFamily="34" charset="-128"/>
+                <a:cs typeface="Segoe UI" panose="020B0502040204020203" pitchFamily="34" charset="0"/>
+              </a:rPr>
+              <a:t> </a:t>
+            </a:r>
+            <a:r>
+              <a:rPr lang="en-US" dirty="0" err="1" smtClean="0">
+                <a:solidFill>
+                  <a:schemeClr val="bg1"/>
+                </a:solidFill>
+                <a:latin typeface="Segoe UI" panose="020B0502040204020203" pitchFamily="34" charset="0"/>
+                <a:ea typeface="Meiryo" panose="020B0604030504040204" pitchFamily="34" charset="-128"/>
+                <a:cs typeface="Segoe UI" panose="020B0502040204020203" pitchFamily="34" charset="0"/>
+              </a:rPr>
+              <a:t>xóa</a:t>
+            </a:r>
+            <a:r>
+              <a:rPr lang="en-US" dirty="0" smtClean="0">
+                <a:solidFill>
+                  <a:schemeClr val="bg1"/>
+                </a:solidFill>
+                <a:latin typeface="Segoe UI" panose="020B0502040204020203" pitchFamily="34" charset="0"/>
+                <a:ea typeface="Meiryo" panose="020B0604030504040204" pitchFamily="34" charset="-128"/>
+                <a:cs typeface="Segoe UI" panose="020B0502040204020203" pitchFamily="34" charset="0"/>
+              </a:rPr>
+              <a:t> </a:t>
+            </a:r>
+            <a:r>
+              <a:rPr lang="en-US" dirty="0" err="1" smtClean="0">
+                <a:solidFill>
+                  <a:schemeClr val="bg1"/>
+                </a:solidFill>
+                <a:latin typeface="Segoe UI" panose="020B0502040204020203" pitchFamily="34" charset="0"/>
+                <a:ea typeface="Meiryo" panose="020B0604030504040204" pitchFamily="34" charset="-128"/>
+                <a:cs typeface="Segoe UI" panose="020B0502040204020203" pitchFamily="34" charset="0"/>
+              </a:rPr>
+              <a:t>ảnh</a:t>
+            </a:r>
+            <a:endParaRPr lang="en-US" dirty="0" smtClean="0">
+              <a:solidFill>
+                <a:schemeClr val="bg1"/>
+              </a:solidFill>
+              <a:latin typeface="Segoe UI" panose="020B0502040204020203" pitchFamily="34" charset="0"/>
+              <a:ea typeface="Meiryo" panose="020B0604030504040204" pitchFamily="34" charset="-128"/>
+              <a:cs typeface="Segoe UI" panose="020B0502040204020203" pitchFamily="34" charset="0"/>
+            </a:endParaRPr>
+          </a:p>
+          <a:p>
+            <a:endParaRPr lang="en-US" dirty="0">
+              <a:solidFill>
+                <a:schemeClr val="bg1"/>
+              </a:solidFill>
+              <a:latin typeface="Segoe UI" panose="020B0502040204020203" pitchFamily="34" charset="0"/>
+              <a:ea typeface="Meiryo" panose="020B0604030504040204" pitchFamily="34" charset="-128"/>
+              <a:cs typeface="Segoe UI" panose="020B0502040204020203" pitchFamily="34" charset="0"/>
+            </a:endParaRPr>
+          </a:p>
+          <a:p>
+            <a:r>
+              <a:rPr lang="en-US" dirty="0" err="1" smtClean="0">
+                <a:solidFill>
+                  <a:schemeClr val="bg1"/>
+                </a:solidFill>
+                <a:latin typeface="Segoe UI" panose="020B0502040204020203" pitchFamily="34" charset="0"/>
+                <a:ea typeface="Meiryo" panose="020B0604030504040204" pitchFamily="34" charset="-128"/>
+                <a:cs typeface="Segoe UI" panose="020B0502040204020203" pitchFamily="34" charset="0"/>
+              </a:rPr>
+              <a:t>Sau</a:t>
+            </a:r>
+            <a:r>
+              <a:rPr lang="en-US" dirty="0" smtClean="0">
+                <a:solidFill>
+                  <a:schemeClr val="bg1"/>
+                </a:solidFill>
+                <a:latin typeface="Segoe UI" panose="020B0502040204020203" pitchFamily="34" charset="0"/>
+                <a:ea typeface="Meiryo" panose="020B0604030504040204" pitchFamily="34" charset="-128"/>
+                <a:cs typeface="Segoe UI" panose="020B0502040204020203" pitchFamily="34" charset="0"/>
+              </a:rPr>
+              <a:t> </a:t>
+            </a:r>
+            <a:r>
+              <a:rPr lang="en-US" dirty="0" err="1" smtClean="0">
+                <a:solidFill>
+                  <a:schemeClr val="bg1"/>
+                </a:solidFill>
+                <a:latin typeface="Segoe UI" panose="020B0502040204020203" pitchFamily="34" charset="0"/>
+                <a:ea typeface="Meiryo" panose="020B0604030504040204" pitchFamily="34" charset="-128"/>
+                <a:cs typeface="Segoe UI" panose="020B0502040204020203" pitchFamily="34" charset="0"/>
+              </a:rPr>
+              <a:t>cùng</a:t>
+            </a:r>
+            <a:r>
+              <a:rPr lang="en-US" dirty="0" smtClean="0">
+                <a:solidFill>
+                  <a:schemeClr val="bg1"/>
+                </a:solidFill>
+                <a:latin typeface="Segoe UI" panose="020B0502040204020203" pitchFamily="34" charset="0"/>
+                <a:ea typeface="Meiryo" panose="020B0604030504040204" pitchFamily="34" charset="-128"/>
+                <a:cs typeface="Segoe UI" panose="020B0502040204020203" pitchFamily="34" charset="0"/>
+              </a:rPr>
+              <a:t> </a:t>
+            </a:r>
+            <a:r>
+              <a:rPr lang="en-US" dirty="0" err="1" smtClean="0">
+                <a:solidFill>
+                  <a:schemeClr val="bg1"/>
+                </a:solidFill>
+                <a:latin typeface="Segoe UI" panose="020B0502040204020203" pitchFamily="34" charset="0"/>
+                <a:ea typeface="Meiryo" panose="020B0604030504040204" pitchFamily="34" charset="-128"/>
+                <a:cs typeface="Segoe UI" panose="020B0502040204020203" pitchFamily="34" charset="0"/>
+              </a:rPr>
+              <a:t>là</a:t>
+            </a:r>
+            <a:r>
+              <a:rPr lang="en-US" dirty="0" smtClean="0">
+                <a:solidFill>
+                  <a:schemeClr val="bg1"/>
+                </a:solidFill>
+                <a:latin typeface="Segoe UI" panose="020B0502040204020203" pitchFamily="34" charset="0"/>
+                <a:ea typeface="Meiryo" panose="020B0604030504040204" pitchFamily="34" charset="-128"/>
+                <a:cs typeface="Segoe UI" panose="020B0502040204020203" pitchFamily="34" charset="0"/>
+              </a:rPr>
+              <a:t> </a:t>
+            </a:r>
+            <a:r>
+              <a:rPr lang="en-US" dirty="0" err="1" smtClean="0">
+                <a:solidFill>
+                  <a:schemeClr val="bg1"/>
+                </a:solidFill>
+                <a:latin typeface="Segoe UI" panose="020B0502040204020203" pitchFamily="34" charset="0"/>
+                <a:ea typeface="Meiryo" panose="020B0604030504040204" pitchFamily="34" charset="-128"/>
+                <a:cs typeface="Segoe UI" panose="020B0502040204020203" pitchFamily="34" charset="0"/>
+              </a:rPr>
+              <a:t>bước</a:t>
+            </a:r>
+            <a:r>
+              <a:rPr lang="en-US" dirty="0" smtClean="0">
+                <a:solidFill>
+                  <a:schemeClr val="bg1"/>
+                </a:solidFill>
+                <a:latin typeface="Segoe UI" panose="020B0502040204020203" pitchFamily="34" charset="0"/>
+                <a:ea typeface="Meiryo" panose="020B0604030504040204" pitchFamily="34" charset="-128"/>
+                <a:cs typeface="Segoe UI" panose="020B0502040204020203" pitchFamily="34" charset="0"/>
+              </a:rPr>
+              <a:t> </a:t>
+            </a:r>
+            <a:r>
+              <a:rPr lang="en-US" dirty="0" err="1" smtClean="0">
+                <a:solidFill>
+                  <a:schemeClr val="bg1"/>
+                </a:solidFill>
+                <a:latin typeface="Segoe UI" panose="020B0502040204020203" pitchFamily="34" charset="0"/>
+                <a:ea typeface="Meiryo" panose="020B0604030504040204" pitchFamily="34" charset="-128"/>
+                <a:cs typeface="Segoe UI" panose="020B0502040204020203" pitchFamily="34" charset="0"/>
+              </a:rPr>
+              <a:t>xóa</a:t>
+            </a:r>
+            <a:r>
+              <a:rPr lang="en-US" dirty="0" smtClean="0">
+                <a:solidFill>
+                  <a:schemeClr val="bg1"/>
+                </a:solidFill>
+                <a:latin typeface="Segoe UI" panose="020B0502040204020203" pitchFamily="34" charset="0"/>
+                <a:ea typeface="Meiryo" panose="020B0604030504040204" pitchFamily="34" charset="-128"/>
+                <a:cs typeface="Segoe UI" panose="020B0502040204020203" pitchFamily="34" charset="0"/>
+              </a:rPr>
+              <a:t> </a:t>
+            </a:r>
+            <a:r>
+              <a:rPr lang="en-US" dirty="0" err="1" smtClean="0">
+                <a:solidFill>
+                  <a:schemeClr val="bg1"/>
+                </a:solidFill>
+                <a:latin typeface="Segoe UI" panose="020B0502040204020203" pitchFamily="34" charset="0"/>
+                <a:ea typeface="Meiryo" panose="020B0604030504040204" pitchFamily="34" charset="-128"/>
+                <a:cs typeface="Segoe UI" panose="020B0502040204020203" pitchFamily="34" charset="0"/>
+              </a:rPr>
+              <a:t>sản</a:t>
+            </a:r>
+            <a:r>
+              <a:rPr lang="en-US" dirty="0" smtClean="0">
+                <a:solidFill>
+                  <a:schemeClr val="bg1"/>
+                </a:solidFill>
+                <a:latin typeface="Segoe UI" panose="020B0502040204020203" pitchFamily="34" charset="0"/>
+                <a:ea typeface="Meiryo" panose="020B0604030504040204" pitchFamily="34" charset="-128"/>
+                <a:cs typeface="Segoe UI" panose="020B0502040204020203" pitchFamily="34" charset="0"/>
+              </a:rPr>
+              <a:t> </a:t>
+            </a:r>
+            <a:r>
+              <a:rPr lang="en-US" dirty="0" err="1" smtClean="0">
+                <a:solidFill>
+                  <a:schemeClr val="bg1"/>
+                </a:solidFill>
+                <a:latin typeface="Segoe UI" panose="020B0502040204020203" pitchFamily="34" charset="0"/>
+                <a:ea typeface="Meiryo" panose="020B0604030504040204" pitchFamily="34" charset="-128"/>
+                <a:cs typeface="Segoe UI" panose="020B0502040204020203" pitchFamily="34" charset="0"/>
+              </a:rPr>
+              <a:t>phẩm</a:t>
+            </a:r>
+            <a:r>
+              <a:rPr lang="en-US" dirty="0" smtClean="0">
+                <a:solidFill>
+                  <a:schemeClr val="bg1"/>
+                </a:solidFill>
+                <a:latin typeface="Segoe UI" panose="020B0502040204020203" pitchFamily="34" charset="0"/>
+                <a:ea typeface="Meiryo" panose="020B0604030504040204" pitchFamily="34" charset="-128"/>
+                <a:cs typeface="Segoe UI" panose="020B0502040204020203" pitchFamily="34" charset="0"/>
+              </a:rPr>
+              <a:t> </a:t>
+            </a:r>
+            <a:r>
+              <a:rPr lang="en-US" dirty="0" err="1" smtClean="0">
+                <a:solidFill>
+                  <a:schemeClr val="bg1"/>
+                </a:solidFill>
+                <a:latin typeface="Segoe UI" panose="020B0502040204020203" pitchFamily="34" charset="0"/>
+                <a:ea typeface="Meiryo" panose="020B0604030504040204" pitchFamily="34" charset="-128"/>
+                <a:cs typeface="Segoe UI" panose="020B0502040204020203" pitchFamily="34" charset="0"/>
+              </a:rPr>
+              <a:t>trên</a:t>
+            </a:r>
+            <a:r>
+              <a:rPr lang="en-US" dirty="0" smtClean="0">
+                <a:solidFill>
+                  <a:schemeClr val="bg1"/>
+                </a:solidFill>
+                <a:latin typeface="Segoe UI" panose="020B0502040204020203" pitchFamily="34" charset="0"/>
+                <a:ea typeface="Meiryo" panose="020B0604030504040204" pitchFamily="34" charset="-128"/>
+                <a:cs typeface="Segoe UI" panose="020B0502040204020203" pitchFamily="34" charset="0"/>
+              </a:rPr>
+              <a:t> database</a:t>
+            </a:r>
+            <a:endParaRPr lang="vi-VN" dirty="0" smtClean="0">
+              <a:solidFill>
+                <a:schemeClr val="bg1"/>
+              </a:solidFill>
+              <a:latin typeface="Segoe UI" panose="020B0502040204020203" pitchFamily="34" charset="0"/>
+              <a:ea typeface="Meiryo" panose="020B0604030504040204" pitchFamily="34" charset="-128"/>
+              <a:cs typeface="Segoe UI" panose="020B0502040204020203" pitchFamily="34" charset="0"/>
+            </a:endParaRPr>
+          </a:p>
+        </p:txBody>
+      </p:sp>
+      <p:pic>
+        <p:nvPicPr>
+          <p:cNvPr id="2" name="Picture 1"/>
+          <p:cNvPicPr>
+            <a:picLocks noChangeAspect="1"/>
+          </p:cNvPicPr>
+          <p:nvPr/>
+        </p:nvPicPr>
+        <p:blipFill>
+          <a:blip r:embed="rId2"/>
+          <a:stretch>
+            <a:fillRect/>
+          </a:stretch>
+        </p:blipFill>
+        <p:spPr>
+          <a:xfrm>
+            <a:off x="5995712" y="1788087"/>
+            <a:ext cx="5283445" cy="1982891"/>
+          </a:xfrm>
+          <a:prstGeom prst="rect">
+            <a:avLst/>
+          </a:prstGeom>
+        </p:spPr>
+      </p:pic>
+    </p:spTree>
+    <p:extLst>
+      <p:ext uri="{BB962C8B-B14F-4D97-AF65-F5344CB8AC3E}">
+        <p14:creationId xmlns:p14="http://schemas.microsoft.com/office/powerpoint/2010/main" val="2778292938"/>
       </p:ext>
     </p:extLst>
   </p:cSld>

</xml_diff>